<commit_message>
add power simulation tutorial
</commit_message>
<xml_diff>
--- a/Presentations/Presentation5_BiasVarienceTradeoff.pptx
+++ b/Presentations/Presentation5_BiasVarienceTradeoff.pptx
@@ -6,13 +6,14 @@
   </p:sldMasterIdLst>
   <p:sldIdLst>
     <p:sldId id="256" r:id="rId2"/>
-    <p:sldId id="263" r:id="rId3"/>
-    <p:sldId id="259" r:id="rId4"/>
-    <p:sldId id="260" r:id="rId5"/>
-    <p:sldId id="261" r:id="rId6"/>
-    <p:sldId id="262" r:id="rId7"/>
-    <p:sldId id="258" r:id="rId8"/>
-    <p:sldId id="257" r:id="rId9"/>
+    <p:sldId id="264" r:id="rId3"/>
+    <p:sldId id="263" r:id="rId4"/>
+    <p:sldId id="259" r:id="rId5"/>
+    <p:sldId id="260" r:id="rId6"/>
+    <p:sldId id="261" r:id="rId7"/>
+    <p:sldId id="262" r:id="rId8"/>
+    <p:sldId id="258" r:id="rId9"/>
+    <p:sldId id="257" r:id="rId10"/>
   </p:sldIdLst>
   <p:sldSz cx="12192000" cy="6858000"/>
   <p:notesSz cx="6858000" cy="9144000"/>
@@ -3462,6 +3463,66 @@
           <a:chExt cx="0" cy="0"/>
         </a:xfrm>
       </p:grpSpPr>
+      <p:pic>
+        <p:nvPicPr>
+          <p:cNvPr id="5" name="Picture 4">
+            <a:extLst>
+              <a:ext uri="{FF2B5EF4-FFF2-40B4-BE49-F238E27FC236}">
+                <a16:creationId xmlns:a16="http://schemas.microsoft.com/office/drawing/2014/main" id="{CF9D603C-B97A-4F11-B364-B1388711AEFB}"/>
+              </a:ext>
+            </a:extLst>
+          </p:cNvPr>
+          <p:cNvPicPr>
+            <a:picLocks noChangeAspect="1"/>
+          </p:cNvPicPr>
+          <p:nvPr/>
+        </p:nvPicPr>
+        <p:blipFill>
+          <a:blip r:embed="rId2"/>
+          <a:stretch>
+            <a:fillRect/>
+          </a:stretch>
+        </p:blipFill>
+        <p:spPr>
+          <a:xfrm>
+            <a:off x="2611103" y="0"/>
+            <a:ext cx="7200172" cy="6858000"/>
+          </a:xfrm>
+          <a:prstGeom prst="rect">
+            <a:avLst/>
+          </a:prstGeom>
+        </p:spPr>
+      </p:pic>
+    </p:spTree>
+    <p:extLst>
+      <p:ext uri="{BB962C8B-B14F-4D97-AF65-F5344CB8AC3E}">
+        <p14:creationId xmlns:p14="http://schemas.microsoft.com/office/powerpoint/2010/main" val="2930715515"/>
+      </p:ext>
+    </p:extLst>
+  </p:cSld>
+  <p:clrMapOvr>
+    <a:masterClrMapping/>
+  </p:clrMapOvr>
+</p:sld>
+</file>
+
+<file path=ppt/slides/slide3.xml><?xml version="1.0" encoding="utf-8"?>
+<p:sld xmlns:a="http://schemas.openxmlformats.org/drawingml/2006/main" xmlns:r="http://schemas.openxmlformats.org/officeDocument/2006/relationships" xmlns:p="http://schemas.openxmlformats.org/presentationml/2006/main">
+  <p:cSld>
+    <p:spTree>
+      <p:nvGrpSpPr>
+        <p:cNvPr id="1" name=""/>
+        <p:cNvGrpSpPr/>
+        <p:nvPr/>
+      </p:nvGrpSpPr>
+      <p:grpSpPr>
+        <a:xfrm>
+          <a:off x="0" y="0"/>
+          <a:ext cx="0" cy="0"/>
+          <a:chOff x="0" y="0"/>
+          <a:chExt cx="0" cy="0"/>
+        </a:xfrm>
+      </p:grpSpPr>
       <p:sp>
         <p:nvSpPr>
           <p:cNvPr id="4" name="Title 3">
@@ -3529,7 +3590,7 @@
 </p:sld>
 </file>
 
-<file path=ppt/slides/slide3.xml><?xml version="1.0" encoding="utf-8"?>
+<file path=ppt/slides/slide4.xml><?xml version="1.0" encoding="utf-8"?>
 <p:sld xmlns:a="http://schemas.openxmlformats.org/drawingml/2006/main" xmlns:r="http://schemas.openxmlformats.org/officeDocument/2006/relationships" xmlns:p="http://schemas.openxmlformats.org/presentationml/2006/main">
   <p:cSld>
     <p:spTree>
@@ -4395,7 +4456,7 @@
 </p:sld>
 </file>
 
-<file path=ppt/slides/slide4.xml><?xml version="1.0" encoding="utf-8"?>
+<file path=ppt/slides/slide5.xml><?xml version="1.0" encoding="utf-8"?>
 <p:sld xmlns:a="http://schemas.openxmlformats.org/drawingml/2006/main" xmlns:r="http://schemas.openxmlformats.org/officeDocument/2006/relationships" xmlns:p="http://schemas.openxmlformats.org/presentationml/2006/main">
   <p:cSld>
     <p:spTree>
@@ -4537,7 +4598,7 @@
 </p:sld>
 </file>
 
-<file path=ppt/slides/slide5.xml><?xml version="1.0" encoding="utf-8"?>
+<file path=ppt/slides/slide6.xml><?xml version="1.0" encoding="utf-8"?>
 <p:sld xmlns:a="http://schemas.openxmlformats.org/drawingml/2006/main" xmlns:r="http://schemas.openxmlformats.org/officeDocument/2006/relationships" xmlns:p="http://schemas.openxmlformats.org/presentationml/2006/main">
   <p:cSld>
     <p:spTree>
@@ -4927,7 +4988,7 @@
 </p:sld>
 </file>
 
-<file path=ppt/slides/slide6.xml><?xml version="1.0" encoding="utf-8"?>
+<file path=ppt/slides/slide7.xml><?xml version="1.0" encoding="utf-8"?>
 <p:sld xmlns:a="http://schemas.openxmlformats.org/drawingml/2006/main" xmlns:r="http://schemas.openxmlformats.org/officeDocument/2006/relationships" xmlns:p="http://schemas.openxmlformats.org/presentationml/2006/main">
   <p:cSld>
     <p:spTree>
@@ -5081,7 +5142,7 @@
 </p:sld>
 </file>
 
-<file path=ppt/slides/slide7.xml><?xml version="1.0" encoding="utf-8"?>
+<file path=ppt/slides/slide8.xml><?xml version="1.0" encoding="utf-8"?>
 <p:sld xmlns:a="http://schemas.openxmlformats.org/drawingml/2006/main" xmlns:r="http://schemas.openxmlformats.org/officeDocument/2006/relationships" xmlns:p="http://schemas.openxmlformats.org/presentationml/2006/main">
   <p:cSld>
     <p:spTree>
@@ -5162,19 +5223,19 @@
                     </m:oMathParaPr>
                     <m:oMath xmlns:m="http://schemas.openxmlformats.org/officeDocument/2006/math">
                       <m:r>
-                        <a:rPr lang="en-US" b="1" i="1" smtClean="0">
+                        <a:rPr lang="en-US" sz="3800" b="1" i="1" smtClean="0">
                           <a:latin typeface="Cambria Math" panose="02040503050406030204" pitchFamily="18" charset="0"/>
                         </a:rPr>
                         <m:t>𝒀</m:t>
                       </m:r>
                       <m:r>
-                        <a:rPr lang="en-US" b="1" i="1" smtClean="0">
+                        <a:rPr lang="en-US" sz="3800" b="1" i="1" smtClean="0">
                           <a:latin typeface="Cambria Math" panose="02040503050406030204" pitchFamily="18" charset="0"/>
                         </a:rPr>
                         <m:t>=</m:t>
                       </m:r>
                       <m:r>
-                        <a:rPr lang="en-US" b="1" i="1" smtClean="0">
+                        <a:rPr lang="en-US" sz="3800" b="1" i="1" smtClean="0">
                           <a:latin typeface="Cambria Math" panose="02040503050406030204" pitchFamily="18" charset="0"/>
                         </a:rPr>
                         <m:t>𝒇</m:t>
@@ -5182,14 +5243,14 @@
                       <m:d>
                         <m:dPr>
                           <m:ctrlPr>
-                            <a:rPr lang="en-US" b="1" i="1" smtClean="0">
+                            <a:rPr lang="en-US" sz="3800" b="1" i="1" smtClean="0">
                               <a:latin typeface="Cambria Math" panose="02040503050406030204" pitchFamily="18" charset="0"/>
                             </a:rPr>
                           </m:ctrlPr>
                         </m:dPr>
                         <m:e>
                           <m:r>
-                            <a:rPr lang="en-US" b="1" i="1" smtClean="0">
+                            <a:rPr lang="en-US" sz="3800" b="1" i="1" smtClean="0">
                               <a:latin typeface="Cambria Math" panose="02040503050406030204" pitchFamily="18" charset="0"/>
                             </a:rPr>
                             <m:t>𝑿</m:t>
@@ -5197,13 +5258,13 @@
                         </m:e>
                       </m:d>
                       <m:r>
-                        <a:rPr lang="en-US" b="1" i="1" smtClean="0">
+                        <a:rPr lang="en-US" sz="3800" b="1" i="1" smtClean="0">
                           <a:latin typeface="Cambria Math" panose="02040503050406030204" pitchFamily="18" charset="0"/>
                         </a:rPr>
                         <m:t>+</m:t>
                       </m:r>
                       <m:r>
-                        <a:rPr lang="en-US" b="1" i="1" smtClean="0">
+                        <a:rPr lang="en-US" sz="3800" b="1" i="1" smtClean="0">
                           <a:latin typeface="Cambria Math" panose="02040503050406030204" pitchFamily="18" charset="0"/>
                         </a:rPr>
                         <m:t>𝝐</m:t>
@@ -5211,7 +5272,7 @@
                     </m:oMath>
                   </m:oMathPara>
                 </a14:m>
-                <a:endParaRPr lang="en-US" b="1" dirty="0"/>
+                <a:endParaRPr lang="en-US" sz="3800" b="1" dirty="0"/>
               </a:p>
               <a:p>
                 <a:pPr marL="0" indent="0" algn="ctr">
@@ -5242,14 +5303,14 @@
                         <m:accPr>
                           <m:chr m:val="̂"/>
                           <m:ctrlPr>
-                            <a:rPr lang="en-US" b="1" i="1" smtClean="0">
+                            <a:rPr lang="en-US" sz="3800" b="1" i="1" smtClean="0">
                               <a:latin typeface="Cambria Math" panose="02040503050406030204" pitchFamily="18" charset="0"/>
                             </a:rPr>
                           </m:ctrlPr>
                         </m:accPr>
                         <m:e>
                           <m:r>
-                            <a:rPr lang="en-US" b="1" i="1">
+                            <a:rPr lang="en-US" sz="3800" b="1" i="1">
                               <a:latin typeface="Cambria Math" panose="02040503050406030204" pitchFamily="18" charset="0"/>
                             </a:rPr>
                             <m:t>𝒀</m:t>
@@ -5257,7 +5318,7 @@
                         </m:e>
                       </m:acc>
                       <m:r>
-                        <a:rPr lang="en-US" b="1" i="1" smtClean="0">
+                        <a:rPr lang="en-US" sz="3800" b="1" i="1" smtClean="0">
                           <a:latin typeface="Cambria Math" panose="02040503050406030204" pitchFamily="18" charset="0"/>
                         </a:rPr>
                         <m:t>=</m:t>
@@ -5266,14 +5327,14 @@
                         <m:accPr>
                           <m:chr m:val="̂"/>
                           <m:ctrlPr>
-                            <a:rPr lang="en-US" b="1" i="1" smtClean="0">
+                            <a:rPr lang="en-US" sz="3800" b="1" i="1" smtClean="0">
                               <a:latin typeface="Cambria Math" panose="02040503050406030204" pitchFamily="18" charset="0"/>
                             </a:rPr>
                           </m:ctrlPr>
                         </m:accPr>
                         <m:e>
                           <m:r>
-                            <a:rPr lang="en-US" b="1" i="1">
+                            <a:rPr lang="en-US" sz="3800" b="1" i="1">
                               <a:latin typeface="Cambria Math" panose="02040503050406030204" pitchFamily="18" charset="0"/>
                             </a:rPr>
                             <m:t>𝒇</m:t>
@@ -5283,14 +5344,14 @@
                       <m:d>
                         <m:dPr>
                           <m:ctrlPr>
-                            <a:rPr lang="en-US" b="1" i="1" smtClean="0">
+                            <a:rPr lang="en-US" sz="3800" b="1" i="1" smtClean="0">
                               <a:latin typeface="Cambria Math" panose="02040503050406030204" pitchFamily="18" charset="0"/>
                             </a:rPr>
                           </m:ctrlPr>
                         </m:dPr>
                         <m:e>
                           <m:r>
-                            <a:rPr lang="en-US" b="1" i="1" smtClean="0">
+                            <a:rPr lang="en-US" sz="3800" b="1" i="1" smtClean="0">
                               <a:latin typeface="Cambria Math" panose="02040503050406030204" pitchFamily="18" charset="0"/>
                             </a:rPr>
                             <m:t>𝑿</m:t>
@@ -5525,7 +5586,7 @@
               <a:blipFill>
                 <a:blip r:embed="rId2"/>
                 <a:stretch>
-                  <a:fillRect l="-58"/>
+                  <a:fillRect l="-58" b="-700"/>
                 </a:stretch>
               </a:blipFill>
             </p:spPr>
@@ -5557,7 +5618,7 @@
 </p:sld>
 </file>
 
-<file path=ppt/slides/slide8.xml><?xml version="1.0" encoding="utf-8"?>
+<file path=ppt/slides/slide9.xml><?xml version="1.0" encoding="utf-8"?>
 <p:sld xmlns:a="http://schemas.openxmlformats.org/drawingml/2006/main" xmlns:r="http://schemas.openxmlformats.org/officeDocument/2006/relationships" xmlns:p="http://schemas.openxmlformats.org/presentationml/2006/main">
   <p:cSld>
     <p:spTree>

</xml_diff>